<commit_message>
put user stories into post note
</commit_message>
<xml_diff>
--- a/branches/ebaysocialhub/docs/socialHub.pptx
+++ b/branches/ebaysocialhub/docs/socialHub.pptx
@@ -10,9 +10,9 @@
   <p:sldIdLst>
     <p:sldId id="257" r:id="rId2"/>
     <p:sldId id="263" r:id="rId3"/>
-    <p:sldId id="260" r:id="rId4"/>
-    <p:sldId id="261" r:id="rId5"/>
-    <p:sldId id="259" r:id="rId6"/>
+    <p:sldId id="267" r:id="rId4"/>
+    <p:sldId id="266" r:id="rId5"/>
+    <p:sldId id="264" r:id="rId6"/>
   </p:sldIdLst>
   <p:sldSz cx="9144000" cy="6858000" type="screen4x3"/>
   <p:notesSz cx="6858000" cy="9144000"/>
@@ -509,88 +509,6 @@
           </a:bodyPr>
           <a:lstStyle/>
           <a:p>
-            <a:r>
-              <a:rPr lang="en-US" altLang="zh-CN" dirty="0" smtClean="0"/>
-              <a:t>A day of </a:t>
-            </a:r>
-            <a:r>
-              <a:rPr lang="en-US" altLang="zh-CN" baseline="0" dirty="0" smtClean="0"/>
-              <a:t>typical </a:t>
-            </a:r>
-            <a:r>
-              <a:rPr lang="en-US" altLang="zh-CN" baseline="0" dirty="0" err="1" smtClean="0"/>
-              <a:t>ebaySeller</a:t>
-            </a:r>
-            <a:endParaRPr lang="en-US" altLang="zh-CN" baseline="0" dirty="0" smtClean="0"/>
-          </a:p>
-          <a:p>
-            <a:endParaRPr lang="en-US" altLang="zh-CN" dirty="0" smtClean="0"/>
-          </a:p>
-          <a:p>
-            <a:r>
-              <a:rPr lang="en-US" altLang="zh-CN" dirty="0" smtClean="0"/>
-              <a:t>List 4 items into</a:t>
-            </a:r>
-            <a:r>
-              <a:rPr lang="en-US" altLang="zh-CN" baseline="0" dirty="0" smtClean="0"/>
-              <a:t> </a:t>
-            </a:r>
-            <a:r>
-              <a:rPr lang="en-US" altLang="zh-CN" baseline="0" dirty="0" err="1" smtClean="0"/>
-              <a:t>jack@eBay</a:t>
-            </a:r>
-            <a:endParaRPr lang="en-US" altLang="zh-CN" baseline="0" dirty="0" smtClean="0"/>
-          </a:p>
-          <a:p>
-            <a:endParaRPr lang="en-US" altLang="zh-CN" baseline="0" dirty="0" smtClean="0"/>
-          </a:p>
-          <a:p>
-            <a:r>
-              <a:rPr lang="en-US" altLang="zh-CN" baseline="0" dirty="0" smtClean="0"/>
-              <a:t>send 4 messages as </a:t>
-            </a:r>
-          </a:p>
-          <a:p>
-            <a:r>
-              <a:rPr lang="en-US" altLang="zh-CN" baseline="0" dirty="0" smtClean="0"/>
-              <a:t>	</a:t>
-            </a:r>
-            <a:r>
-              <a:rPr lang="en-US" altLang="zh-CN" baseline="0" dirty="0" err="1" smtClean="0"/>
-              <a:t>jack@twitter</a:t>
-            </a:r>
-            <a:endParaRPr lang="en-US" altLang="zh-CN" baseline="0" dirty="0" smtClean="0"/>
-          </a:p>
-          <a:p>
-            <a:r>
-              <a:rPr lang="en-US" altLang="zh-CN" baseline="0" dirty="0" smtClean="0"/>
-              <a:t>	</a:t>
-            </a:r>
-            <a:r>
-              <a:rPr lang="en-US" altLang="zh-CN" baseline="0" dirty="0" err="1" smtClean="0"/>
-              <a:t>jack@facebook</a:t>
-            </a:r>
-            <a:endParaRPr lang="en-US" altLang="zh-CN" baseline="0" dirty="0" smtClean="0"/>
-          </a:p>
-          <a:p>
-            <a:r>
-              <a:rPr lang="en-US" altLang="zh-CN" baseline="0" dirty="0" smtClean="0"/>
-              <a:t>	</a:t>
-            </a:r>
-          </a:p>
-          <a:p>
-            <a:endParaRPr lang="en-US" altLang="zh-CN" baseline="0" dirty="0" smtClean="0"/>
-          </a:p>
-          <a:p>
-            <a:endParaRPr lang="en-US" altLang="zh-CN" baseline="0" dirty="0" smtClean="0"/>
-          </a:p>
-          <a:p>
-            <a:endParaRPr lang="en-US" altLang="zh-CN" baseline="0" dirty="0" smtClean="0"/>
-          </a:p>
-          <a:p>
-            <a:endParaRPr lang="en-US" altLang="zh-CN" baseline="0" dirty="0" smtClean="0"/>
-          </a:p>
-          <a:p>
             <a:endParaRPr lang="zh-CN" altLang="en-US" dirty="0"/>
           </a:p>
         </p:txBody>
@@ -673,86 +591,43 @@
           </a:bodyPr>
           <a:lstStyle/>
           <a:p>
+            <a:pPr marL="0" marR="0" indent="0" algn="l" defTabSz="914400" rtl="0" eaLnBrk="1" fontAlgn="auto" latinLnBrk="0" hangingPunct="1">
+              <a:lnSpc>
+                <a:spcPct val="100000"/>
+              </a:lnSpc>
+              <a:spcBef>
+                <a:spcPts val="0"/>
+              </a:spcBef>
+              <a:spcAft>
+                <a:spcPts val="0"/>
+              </a:spcAft>
+              <a:buClrTx/>
+              <a:buSzTx/>
+              <a:buFontTx/>
+              <a:buNone/>
+              <a:tabLst/>
+              <a:defRPr/>
+            </a:pPr>
             <a:r>
               <a:rPr lang="en-US" altLang="zh-CN" dirty="0" smtClean="0"/>
-              <a:t>A day of </a:t>
-            </a:r>
-            <a:r>
-              <a:rPr lang="en-US" altLang="zh-CN" baseline="0" dirty="0" smtClean="0"/>
-              <a:t>typical </a:t>
-            </a:r>
-            <a:r>
-              <a:rPr lang="en-US" altLang="zh-CN" baseline="0" dirty="0" err="1" smtClean="0"/>
-              <a:t>ebaySeller</a:t>
-            </a:r>
-            <a:endParaRPr lang="en-US" altLang="zh-CN" baseline="0" dirty="0" smtClean="0"/>
-          </a:p>
-          <a:p>
-            <a:endParaRPr lang="en-US" altLang="zh-CN" dirty="0" smtClean="0"/>
-          </a:p>
-          <a:p>
+              <a:t>People takes more time on social-style web-sites, other than traditional ones, such as </a:t>
+            </a:r>
+            <a:r>
+              <a:rPr lang="en-US" altLang="zh-CN" dirty="0" err="1" smtClean="0"/>
+              <a:t>google</a:t>
+            </a:r>
             <a:r>
               <a:rPr lang="en-US" altLang="zh-CN" dirty="0" smtClean="0"/>
-              <a:t>List 4 items into</a:t>
-            </a:r>
-            <a:r>
-              <a:rPr lang="en-US" altLang="zh-CN" baseline="0" dirty="0" smtClean="0"/>
-              <a:t> </a:t>
-            </a:r>
-            <a:r>
-              <a:rPr lang="en-US" altLang="zh-CN" baseline="0" dirty="0" err="1" smtClean="0"/>
-              <a:t>jack@eBay</a:t>
-            </a:r>
-            <a:endParaRPr lang="en-US" altLang="zh-CN" baseline="0" dirty="0" smtClean="0"/>
-          </a:p>
-          <a:p>
-            <a:endParaRPr lang="en-US" altLang="zh-CN" baseline="0" dirty="0" smtClean="0"/>
-          </a:p>
-          <a:p>
-            <a:r>
-              <a:rPr lang="en-US" altLang="zh-CN" baseline="0" dirty="0" smtClean="0"/>
-              <a:t>send 4 messages as </a:t>
-            </a:r>
-          </a:p>
-          <a:p>
-            <a:r>
-              <a:rPr lang="en-US" altLang="zh-CN" baseline="0" dirty="0" smtClean="0"/>
-              <a:t>	</a:t>
-            </a:r>
-            <a:r>
-              <a:rPr lang="en-US" altLang="zh-CN" baseline="0" dirty="0" err="1" smtClean="0"/>
-              <a:t>jack@twitter</a:t>
-            </a:r>
-            <a:endParaRPr lang="en-US" altLang="zh-CN" baseline="0" dirty="0" smtClean="0"/>
-          </a:p>
-          <a:p>
-            <a:r>
-              <a:rPr lang="en-US" altLang="zh-CN" baseline="0" dirty="0" smtClean="0"/>
-              <a:t>	</a:t>
-            </a:r>
-            <a:r>
-              <a:rPr lang="en-US" altLang="zh-CN" baseline="0" dirty="0" err="1" smtClean="0"/>
-              <a:t>jack@facebook</a:t>
-            </a:r>
-            <a:endParaRPr lang="en-US" altLang="zh-CN" baseline="0" dirty="0" smtClean="0"/>
-          </a:p>
-          <a:p>
-            <a:r>
-              <a:rPr lang="en-US" altLang="zh-CN" baseline="0" dirty="0" smtClean="0"/>
-              <a:t>	</a:t>
-            </a:r>
-          </a:p>
-          <a:p>
-            <a:endParaRPr lang="en-US" altLang="zh-CN" baseline="0" dirty="0" smtClean="0"/>
-          </a:p>
-          <a:p>
-            <a:endParaRPr lang="en-US" altLang="zh-CN" baseline="0" dirty="0" smtClean="0"/>
-          </a:p>
-          <a:p>
-            <a:endParaRPr lang="en-US" altLang="zh-CN" baseline="0" dirty="0" smtClean="0"/>
-          </a:p>
-          <a:p>
-            <a:endParaRPr lang="en-US" altLang="zh-CN" baseline="0" dirty="0" smtClean="0"/>
+              <a:t>, </a:t>
+            </a:r>
+            <a:r>
+              <a:rPr lang="en-US" altLang="zh-CN" dirty="0" err="1" smtClean="0"/>
+              <a:t>flickr</a:t>
+            </a:r>
+            <a:r>
+              <a:rPr lang="en-US" altLang="zh-CN" dirty="0" smtClean="0"/>
+              <a:t> and eBay</a:t>
+            </a:r>
           </a:p>
           <a:p>
             <a:endParaRPr lang="zh-CN" altLang="en-US" dirty="0"/>
@@ -778,6 +653,170 @@
               <a:rPr lang="zh-CN" altLang="en-US" smtClean="0"/>
               <a:pPr/>
               <a:t>2</a:t>
+            </a:fld>
+            <a:endParaRPr lang="zh-CN" altLang="en-US"/>
+          </a:p>
+        </p:txBody>
+      </p:sp>
+    </p:spTree>
+  </p:cSld>
+  <p:clrMapOvr>
+    <a:masterClrMapping/>
+  </p:clrMapOvr>
+</p:notes>
+</file>
+
+<file path=ppt/notesSlides/notesSlide3.xml><?xml version="1.0" encoding="utf-8"?>
+<p:notes xmlns:a="http://schemas.openxmlformats.org/drawingml/2006/main" xmlns:r="http://schemas.openxmlformats.org/officeDocument/2006/relationships" xmlns:p="http://schemas.openxmlformats.org/presentationml/2006/main">
+  <p:cSld>
+    <p:spTree>
+      <p:nvGrpSpPr>
+        <p:cNvPr id="1" name=""/>
+        <p:cNvGrpSpPr/>
+        <p:nvPr/>
+      </p:nvGrpSpPr>
+      <p:grpSpPr>
+        <a:xfrm>
+          <a:off x="0" y="0"/>
+          <a:ext cx="0" cy="0"/>
+          <a:chOff x="0" y="0"/>
+          <a:chExt cx="0" cy="0"/>
+        </a:xfrm>
+      </p:grpSpPr>
+      <p:sp>
+        <p:nvSpPr>
+          <p:cNvPr id="2" name="Slide Image Placeholder 1"/>
+          <p:cNvSpPr>
+            <a:spLocks noGrp="1" noRot="1" noChangeAspect="1"/>
+          </p:cNvSpPr>
+          <p:nvPr>
+            <p:ph type="sldImg"/>
+          </p:nvPr>
+        </p:nvSpPr>
+        <p:spPr/>
+      </p:sp>
+      <p:sp>
+        <p:nvSpPr>
+          <p:cNvPr id="3" name="Notes Placeholder 2"/>
+          <p:cNvSpPr>
+            <a:spLocks noGrp="1"/>
+          </p:cNvSpPr>
+          <p:nvPr>
+            <p:ph type="body" idx="1"/>
+          </p:nvPr>
+        </p:nvSpPr>
+        <p:spPr/>
+        <p:txBody>
+          <a:bodyPr>
+            <a:normAutofit/>
+          </a:bodyPr>
+          <a:lstStyle/>
+          <a:p>
+            <a:endParaRPr lang="zh-CN" altLang="en-US" dirty="0"/>
+          </a:p>
+        </p:txBody>
+      </p:sp>
+      <p:sp>
+        <p:nvSpPr>
+          <p:cNvPr id="4" name="Slide Number Placeholder 3"/>
+          <p:cNvSpPr>
+            <a:spLocks noGrp="1"/>
+          </p:cNvSpPr>
+          <p:nvPr>
+            <p:ph type="sldNum" sz="quarter" idx="10"/>
+          </p:nvPr>
+        </p:nvSpPr>
+        <p:spPr/>
+        <p:txBody>
+          <a:bodyPr/>
+          <a:lstStyle/>
+          <a:p>
+            <a:fld id="{C49BC494-DA72-41F5-B6E2-3C9B37A79830}" type="slidenum">
+              <a:rPr lang="zh-CN" altLang="en-US" smtClean="0"/>
+              <a:pPr/>
+              <a:t>3</a:t>
+            </a:fld>
+            <a:endParaRPr lang="zh-CN" altLang="en-US"/>
+          </a:p>
+        </p:txBody>
+      </p:sp>
+    </p:spTree>
+  </p:cSld>
+  <p:clrMapOvr>
+    <a:masterClrMapping/>
+  </p:clrMapOvr>
+</p:notes>
+</file>
+
+<file path=ppt/notesSlides/notesSlide4.xml><?xml version="1.0" encoding="utf-8"?>
+<p:notes xmlns:a="http://schemas.openxmlformats.org/drawingml/2006/main" xmlns:r="http://schemas.openxmlformats.org/officeDocument/2006/relationships" xmlns:p="http://schemas.openxmlformats.org/presentationml/2006/main">
+  <p:cSld>
+    <p:spTree>
+      <p:nvGrpSpPr>
+        <p:cNvPr id="1" name=""/>
+        <p:cNvGrpSpPr/>
+        <p:nvPr/>
+      </p:nvGrpSpPr>
+      <p:grpSpPr>
+        <a:xfrm>
+          <a:off x="0" y="0"/>
+          <a:ext cx="0" cy="0"/>
+          <a:chOff x="0" y="0"/>
+          <a:chExt cx="0" cy="0"/>
+        </a:xfrm>
+      </p:grpSpPr>
+      <p:sp>
+        <p:nvSpPr>
+          <p:cNvPr id="2" name="Slide Image Placeholder 1"/>
+          <p:cNvSpPr>
+            <a:spLocks noGrp="1" noRot="1" noChangeAspect="1"/>
+          </p:cNvSpPr>
+          <p:nvPr>
+            <p:ph type="sldImg"/>
+          </p:nvPr>
+        </p:nvSpPr>
+        <p:spPr/>
+      </p:sp>
+      <p:sp>
+        <p:nvSpPr>
+          <p:cNvPr id="3" name="Notes Placeholder 2"/>
+          <p:cNvSpPr>
+            <a:spLocks noGrp="1"/>
+          </p:cNvSpPr>
+          <p:nvPr>
+            <p:ph type="body" idx="1"/>
+          </p:nvPr>
+        </p:nvSpPr>
+        <p:spPr/>
+        <p:txBody>
+          <a:bodyPr>
+            <a:normAutofit/>
+          </a:bodyPr>
+          <a:lstStyle/>
+          <a:p>
+            <a:endParaRPr lang="zh-CN" altLang="en-US" dirty="0"/>
+          </a:p>
+        </p:txBody>
+      </p:sp>
+      <p:sp>
+        <p:nvSpPr>
+          <p:cNvPr id="4" name="Slide Number Placeholder 3"/>
+          <p:cNvSpPr>
+            <a:spLocks noGrp="1"/>
+          </p:cNvSpPr>
+          <p:nvPr>
+            <p:ph type="sldNum" sz="quarter" idx="10"/>
+          </p:nvPr>
+        </p:nvSpPr>
+        <p:spPr/>
+        <p:txBody>
+          <a:bodyPr/>
+          <a:lstStyle/>
+          <a:p>
+            <a:fld id="{C49BC494-DA72-41F5-B6E2-3C9B37A79830}" type="slidenum">
+              <a:rPr lang="zh-CN" altLang="en-US" smtClean="0"/>
+              <a:pPr/>
+              <a:t>5</a:t>
             </a:fld>
             <a:endParaRPr lang="zh-CN" altLang="en-US"/>
           </a:p>
@@ -3223,9 +3262,27 @@
 <p:sldMaster xmlns:a="http://schemas.openxmlformats.org/drawingml/2006/main" xmlns:r="http://schemas.openxmlformats.org/officeDocument/2006/relationships" xmlns:p="http://schemas.openxmlformats.org/presentationml/2006/main">
   <p:cSld>
     <p:bg>
-      <p:bgRef idx="1001">
-        <a:schemeClr val="bg1"/>
-      </p:bgRef>
+      <p:bgPr>
+        <a:gradFill flip="none" rotWithShape="1">
+          <a:gsLst>
+            <a:gs pos="0">
+              <a:srgbClr val="8488C4"/>
+            </a:gs>
+            <a:gs pos="53000">
+              <a:srgbClr val="D4DEFF"/>
+            </a:gs>
+            <a:gs pos="83000">
+              <a:srgbClr val="D4DEFF"/>
+            </a:gs>
+            <a:gs pos="100000">
+              <a:srgbClr val="96AB94"/>
+            </a:gs>
+          </a:gsLst>
+          <a:lin ang="5400000" scaled="0"/>
+          <a:tileRect/>
+        </a:gradFill>
+        <a:effectLst/>
+      </p:bgPr>
     </p:bg>
     <p:spTree>
       <p:nvGrpSpPr>
@@ -3745,64 +3802,194 @@
       </p:grpSpPr>
       <p:sp>
         <p:nvSpPr>
-          <p:cNvPr id="3" name="Content Placeholder 2"/>
-          <p:cNvSpPr>
-            <a:spLocks noGrp="1"/>
-          </p:cNvSpPr>
-          <p:nvPr>
-            <p:ph idx="1"/>
-          </p:nvPr>
+          <p:cNvPr id="5" name="Rectangle 4"/>
+          <p:cNvSpPr/>
+          <p:nvPr/>
         </p:nvSpPr>
         <p:spPr>
           <a:xfrm>
-            <a:off x="518864" y="260648"/>
-            <a:ext cx="8229600" cy="5865515"/>
+            <a:off x="179512" y="1340768"/>
+            <a:ext cx="8536311" cy="3046988"/>
           </a:xfrm>
+          <a:prstGeom prst="rect">
+            <a:avLst/>
+          </a:prstGeom>
+          <a:noFill/>
         </p:spPr>
         <p:txBody>
-          <a:bodyPr/>
-          <a:lstStyle/>
-          <a:p>
-            <a:r>
-              <a:rPr lang="en-US" altLang="zh-CN" dirty="0" smtClean="0"/>
-              <a:t>Whether you are willing or not, this is an age of social network</a:t>
-            </a:r>
-          </a:p>
-          <a:p>
-            <a:r>
-              <a:rPr lang="en-US" altLang="zh-CN" dirty="0" smtClean="0"/>
-              <a:t>Whether you believe or not, the social network has been changing the world</a:t>
-            </a:r>
-          </a:p>
-          <a:p>
-            <a:endParaRPr lang="en-US" altLang="zh-CN" dirty="0" smtClean="0"/>
-          </a:p>
-          <a:p>
-            <a:r>
-              <a:rPr lang="en-US" altLang="zh-CN" dirty="0" smtClean="0"/>
-              <a:t>People takes more time on social-style web-sites, other than traditional ones, such as </a:t>
-            </a:r>
-            <a:r>
-              <a:rPr lang="en-US" altLang="zh-CN" dirty="0" err="1" smtClean="0"/>
-              <a:t>google</a:t>
-            </a:r>
-            <a:r>
-              <a:rPr lang="en-US" altLang="zh-CN" dirty="0" smtClean="0"/>
-              <a:t>, </a:t>
-            </a:r>
-            <a:r>
-              <a:rPr lang="en-US" altLang="zh-CN" dirty="0" err="1" smtClean="0"/>
-              <a:t>flickr</a:t>
-            </a:r>
-            <a:r>
-              <a:rPr lang="en-US" altLang="zh-CN" dirty="0" smtClean="0"/>
-              <a:t> </a:t>
-            </a:r>
-            <a:r>
-              <a:rPr lang="en-US" altLang="zh-CN" smtClean="0"/>
-              <a:t>and eBay</a:t>
-            </a:r>
-            <a:endParaRPr lang="en-US" altLang="zh-CN" dirty="0" smtClean="0"/>
+          <a:bodyPr wrap="none" lIns="91440" tIns="45720" rIns="91440" bIns="45720">
+            <a:spAutoFit/>
+          </a:bodyPr>
+          <a:lstStyle/>
+          <a:p>
+            <a:r>
+              <a:rPr lang="en-US" altLang="zh-CN" sz="4800" b="1" spc="50" dirty="0" smtClean="0">
+                <a:ln w="13500">
+                  <a:solidFill>
+                    <a:schemeClr val="accent1">
+                      <a:shade val="2500"/>
+                      <a:alpha val="6500"/>
+                    </a:schemeClr>
+                  </a:solidFill>
+                  <a:prstDash val="solid"/>
+                </a:ln>
+                <a:solidFill>
+                  <a:schemeClr val="accent1">
+                    <a:lumMod val="75000"/>
+                  </a:schemeClr>
+                </a:solidFill>
+                <a:effectLst>
+                  <a:glow rad="63500">
+                    <a:schemeClr val="accent1">
+                      <a:satMod val="175000"/>
+                      <a:alpha val="40000"/>
+                    </a:schemeClr>
+                  </a:glow>
+                  <a:innerShdw blurRad="50900" dist="38500" dir="13500000">
+                    <a:srgbClr val="000000">
+                      <a:alpha val="60000"/>
+                    </a:srgbClr>
+                  </a:innerShdw>
+                </a:effectLst>
+                <a:latin typeface="Harlow Solid Italic" pitchFamily="82" charset="0"/>
+              </a:rPr>
+              <a:t>Whether you like or not</a:t>
+            </a:r>
+          </a:p>
+          <a:p>
+            <a:r>
+              <a:rPr lang="en-US" altLang="zh-CN" sz="4800" b="1" spc="50" dirty="0" smtClean="0">
+                <a:ln w="13500">
+                  <a:solidFill>
+                    <a:schemeClr val="accent1">
+                      <a:shade val="2500"/>
+                      <a:alpha val="6500"/>
+                    </a:schemeClr>
+                  </a:solidFill>
+                  <a:prstDash val="solid"/>
+                </a:ln>
+                <a:solidFill>
+                  <a:schemeClr val="accent1">
+                    <a:lumMod val="75000"/>
+                  </a:schemeClr>
+                </a:solidFill>
+                <a:effectLst>
+                  <a:glow rad="63500">
+                    <a:schemeClr val="accent1">
+                      <a:satMod val="175000"/>
+                      <a:alpha val="40000"/>
+                    </a:schemeClr>
+                  </a:glow>
+                  <a:innerShdw blurRad="50900" dist="38500" dir="13500000">
+                    <a:srgbClr val="000000">
+                      <a:alpha val="60000"/>
+                    </a:srgbClr>
+                  </a:innerShdw>
+                </a:effectLst>
+                <a:latin typeface="Harlow Solid Italic" pitchFamily="82" charset="0"/>
+              </a:rPr>
+              <a:t>	this is an age of social network</a:t>
+            </a:r>
+          </a:p>
+          <a:p>
+            <a:r>
+              <a:rPr lang="en-US" altLang="zh-CN" sz="4800" b="1" spc="50" dirty="0" smtClean="0">
+                <a:ln w="13500">
+                  <a:solidFill>
+                    <a:schemeClr val="accent1">
+                      <a:shade val="2500"/>
+                      <a:alpha val="6500"/>
+                    </a:schemeClr>
+                  </a:solidFill>
+                  <a:prstDash val="solid"/>
+                </a:ln>
+                <a:solidFill>
+                  <a:schemeClr val="accent1">
+                    <a:lumMod val="75000"/>
+                  </a:schemeClr>
+                </a:solidFill>
+                <a:effectLst>
+                  <a:glow rad="63500">
+                    <a:schemeClr val="accent1">
+                      <a:satMod val="175000"/>
+                      <a:alpha val="40000"/>
+                    </a:schemeClr>
+                  </a:glow>
+                  <a:innerShdw blurRad="50900" dist="38500" dir="13500000">
+                    <a:srgbClr val="000000">
+                      <a:alpha val="60000"/>
+                    </a:srgbClr>
+                  </a:innerShdw>
+                </a:effectLst>
+                <a:latin typeface="Harlow Solid Italic" pitchFamily="82" charset="0"/>
+              </a:rPr>
+              <a:t>Whether you believe or not</a:t>
+            </a:r>
+          </a:p>
+          <a:p>
+            <a:r>
+              <a:rPr lang="en-US" altLang="zh-CN" sz="4800" b="1" spc="50" dirty="0" smtClean="0">
+                <a:ln w="13500">
+                  <a:solidFill>
+                    <a:schemeClr val="accent1">
+                      <a:shade val="2500"/>
+                      <a:alpha val="6500"/>
+                    </a:schemeClr>
+                  </a:solidFill>
+                  <a:prstDash val="solid"/>
+                </a:ln>
+                <a:solidFill>
+                  <a:schemeClr val="accent1">
+                    <a:lumMod val="75000"/>
+                  </a:schemeClr>
+                </a:solidFill>
+                <a:effectLst>
+                  <a:glow rad="63500">
+                    <a:schemeClr val="accent1">
+                      <a:satMod val="175000"/>
+                      <a:alpha val="40000"/>
+                    </a:schemeClr>
+                  </a:glow>
+                  <a:innerShdw blurRad="50900" dist="38500" dir="13500000">
+                    <a:srgbClr val="000000">
+                      <a:alpha val="60000"/>
+                    </a:srgbClr>
+                  </a:innerShdw>
+                </a:effectLst>
+                <a:latin typeface="Harlow Solid Italic" pitchFamily="82" charset="0"/>
+              </a:rPr>
+              <a:t>	it has been changing the world</a:t>
+            </a:r>
+            <a:endParaRPr lang="en-US" altLang="zh-CN" sz="4800" b="1" spc="50" dirty="0">
+              <a:ln w="13500">
+                <a:solidFill>
+                  <a:schemeClr val="accent1">
+                    <a:shade val="2500"/>
+                    <a:alpha val="6500"/>
+                  </a:schemeClr>
+                </a:solidFill>
+                <a:prstDash val="solid"/>
+              </a:ln>
+              <a:solidFill>
+                <a:schemeClr val="accent1">
+                  <a:lumMod val="75000"/>
+                </a:schemeClr>
+              </a:solidFill>
+              <a:effectLst>
+                <a:glow rad="63500">
+                  <a:schemeClr val="accent1">
+                    <a:satMod val="175000"/>
+                    <a:alpha val="40000"/>
+                  </a:schemeClr>
+                </a:glow>
+                <a:innerShdw blurRad="50900" dist="38500" dir="13500000">
+                  <a:srgbClr val="000000">
+                    <a:alpha val="60000"/>
+                  </a:srgbClr>
+                </a:innerShdw>
+              </a:effectLst>
+              <a:latin typeface="Harlow Solid Italic" pitchFamily="82" charset="0"/>
+            </a:endParaRPr>
           </a:p>
         </p:txBody>
       </p:sp>
@@ -3811,6 +3998,92 @@
   <p:clrMapOvr>
     <a:masterClrMapping/>
   </p:clrMapOvr>
+  <p:timing>
+    <p:tnLst>
+      <p:par>
+        <p:cTn id="1" dur="indefinite" restart="never" nodeType="tmRoot">
+          <p:childTnLst>
+            <p:seq concurrent="1" nextAc="seek">
+              <p:cTn id="2" dur="indefinite" nodeType="mainSeq">
+                <p:childTnLst>
+                  <p:par>
+                    <p:cTn id="3" fill="hold">
+                      <p:stCondLst>
+                        <p:cond delay="indefinite"/>
+                      </p:stCondLst>
+                      <p:childTnLst>
+                        <p:par>
+                          <p:cTn id="4" fill="hold">
+                            <p:stCondLst>
+                              <p:cond delay="0"/>
+                            </p:stCondLst>
+                            <p:childTnLst>
+                              <p:par>
+                                <p:cTn id="5" presetID="10" presetClass="entr" presetSubtype="0" fill="hold" grpId="0" nodeType="clickEffect">
+                                  <p:stCondLst>
+                                    <p:cond delay="0"/>
+                                  </p:stCondLst>
+                                  <p:childTnLst>
+                                    <p:set>
+                                      <p:cBhvr>
+                                        <p:cTn id="6" dur="1" fill="hold">
+                                          <p:stCondLst>
+                                            <p:cond delay="0"/>
+                                          </p:stCondLst>
+                                        </p:cTn>
+                                        <p:tgtEl>
+                                          <p:spTgt spid="5"/>
+                                        </p:tgtEl>
+                                        <p:attrNameLst>
+                                          <p:attrName>style.visibility</p:attrName>
+                                        </p:attrNameLst>
+                                      </p:cBhvr>
+                                      <p:to>
+                                        <p:strVal val="visible"/>
+                                      </p:to>
+                                    </p:set>
+                                    <p:animEffect transition="in" filter="fade">
+                                      <p:cBhvr>
+                                        <p:cTn id="7" dur="3000"/>
+                                        <p:tgtEl>
+                                          <p:spTgt spid="5"/>
+                                        </p:tgtEl>
+                                      </p:cBhvr>
+                                    </p:animEffect>
+                                  </p:childTnLst>
+                                </p:cTn>
+                              </p:par>
+                            </p:childTnLst>
+                          </p:cTn>
+                        </p:par>
+                      </p:childTnLst>
+                    </p:cTn>
+                  </p:par>
+                </p:childTnLst>
+              </p:cTn>
+              <p:prevCondLst>
+                <p:cond evt="onPrev" delay="0">
+                  <p:tgtEl>
+                    <p:sldTgt/>
+                  </p:tgtEl>
+                </p:cond>
+              </p:prevCondLst>
+              <p:nextCondLst>
+                <p:cond evt="onNext" delay="0">
+                  <p:tgtEl>
+                    <p:sldTgt/>
+                  </p:tgtEl>
+                </p:cond>
+              </p:nextCondLst>
+            </p:seq>
+          </p:childTnLst>
+        </p:cTn>
+      </p:par>
+    </p:tnLst>
+    <p:bldLst>
+      <p:bldP spid="5" grpId="0"/>
+    </p:bldLst>
+  </p:timing>
 </p:sld>
 </file>
 
@@ -3851,17 +4124,77 @@
           <a:bodyPr/>
           <a:lstStyle/>
           <a:p>
+            <a:endParaRPr lang="en-US" altLang="zh-CN" dirty="0" smtClean="0"/>
+          </a:p>
+          <a:p>
             <a:r>
               <a:rPr lang="en-US" altLang="zh-CN" dirty="0" smtClean="0"/>
-              <a:t>Whether you are willing or not, this is an age of social network</a:t>
-            </a:r>
-          </a:p>
-          <a:p>
+              <a:t>Social-network have </a:t>
+            </a:r>
+            <a:r>
+              <a:rPr lang="en-US" altLang="zh-CN" sz="4400" dirty="0" smtClean="0">
+                <a:solidFill>
+                  <a:schemeClr val="accent6">
+                    <a:lumMod val="75000"/>
+                  </a:schemeClr>
+                </a:solidFill>
+              </a:rPr>
+              <a:t>giant</a:t>
+            </a:r>
             <a:r>
               <a:rPr lang="en-US" altLang="zh-CN" dirty="0" smtClean="0"/>
-              <a:t>Whether you believe or not, the social network has been changing the world</a:t>
-            </a:r>
-            <a:endParaRPr lang="zh-CN" altLang="en-US" dirty="0"/>
+              <a:t> amount of users</a:t>
+            </a:r>
+          </a:p>
+          <a:p>
+            <a:r>
+              <a:rPr lang="en-US" altLang="zh-CN" dirty="0" smtClean="0"/>
+              <a:t>Part of them are eBay users.</a:t>
+            </a:r>
+          </a:p>
+          <a:p>
+            <a:r>
+              <a:rPr lang="en-US" altLang="zh-CN" dirty="0" smtClean="0"/>
+              <a:t>Most of them </a:t>
+            </a:r>
+            <a:r>
+              <a:rPr lang="en-US" altLang="zh-CN" sz="5400" dirty="0" smtClean="0">
+                <a:solidFill>
+                  <a:schemeClr val="accent6">
+                    <a:lumMod val="75000"/>
+                  </a:schemeClr>
+                </a:solidFill>
+              </a:rPr>
+              <a:t>could be</a:t>
+            </a:r>
+            <a:r>
+              <a:rPr lang="en-US" altLang="zh-CN" dirty="0" smtClean="0">
+                <a:solidFill>
+                  <a:schemeClr val="accent6">
+                    <a:lumMod val="75000"/>
+                  </a:schemeClr>
+                </a:solidFill>
+              </a:rPr>
+              <a:t> </a:t>
+            </a:r>
+            <a:r>
+              <a:rPr lang="en-US" altLang="zh-CN" dirty="0" smtClean="0"/>
+              <a:t>eBay users</a:t>
+            </a:r>
+          </a:p>
+          <a:p>
+            <a:endParaRPr lang="en-US" altLang="zh-CN" dirty="0" smtClean="0"/>
+          </a:p>
+          <a:p>
+            <a:r>
+              <a:rPr lang="en-US" altLang="zh-CN" dirty="0" smtClean="0"/>
+              <a:t>Is </a:t>
+            </a:r>
+            <a:r>
+              <a:rPr lang="en-US" altLang="zh-CN" dirty="0" smtClean="0"/>
+              <a:t>there anything eBay can do for them?</a:t>
+            </a:r>
+            <a:endParaRPr lang="en-US" altLang="zh-CN" dirty="0" smtClean="0"/>
           </a:p>
         </p:txBody>
       </p:sp>
@@ -3870,6 +4203,13 @@
   <p:clrMapOvr>
     <a:masterClrMapping/>
   </p:clrMapOvr>
+  <p:timing>
+    <p:tnLst>
+      <p:par>
+        <p:cTn id="1" dur="indefinite" restart="never" nodeType="tmRoot"/>
+      </p:par>
+    </p:tnLst>
+  </p:timing>
 </p:sld>
 </file>
 
@@ -3890,220 +4230,188 @@
           <a:chExt cx="0" cy="0"/>
         </a:xfrm>
       </p:grpSpPr>
-      <p:sp>
-        <p:nvSpPr>
-          <p:cNvPr id="22" name="Cloud 21"/>
-          <p:cNvSpPr/>
+      <p:grpSp>
+        <p:nvGrpSpPr>
+          <p:cNvPr id="9" name="Group 8"/>
+          <p:cNvGrpSpPr/>
           <p:nvPr/>
-        </p:nvSpPr>
-        <p:spPr>
+        </p:nvGrpSpPr>
+        <p:grpSpPr>
           <a:xfrm>
-            <a:off x="2483768" y="2204864"/>
-            <a:ext cx="3816424" cy="2304256"/>
+            <a:off x="827584" y="764704"/>
+            <a:ext cx="2960499" cy="3240360"/>
+            <a:chOff x="827584" y="1052736"/>
+            <a:chExt cx="2960499" cy="3240360"/>
           </a:xfrm>
-          <a:prstGeom prst="cloud">
-            <a:avLst/>
-          </a:prstGeom>
-          <a:solidFill>
-            <a:schemeClr val="accent3">
-              <a:lumMod val="20000"/>
-              <a:lumOff val="80000"/>
-            </a:schemeClr>
-          </a:solidFill>
-          <a:ln>
-            <a:solidFill>
-              <a:schemeClr val="accent3">
-                <a:lumMod val="50000"/>
-              </a:schemeClr>
-            </a:solidFill>
-          </a:ln>
-        </p:spPr>
-        <p:style>
-          <a:lnRef idx="2">
-            <a:schemeClr val="accent1">
-              <a:shade val="50000"/>
-            </a:schemeClr>
-          </a:lnRef>
-          <a:fillRef idx="1">
-            <a:schemeClr val="accent1"/>
-          </a:fillRef>
-          <a:effectRef idx="0">
-            <a:schemeClr val="accent1"/>
-          </a:effectRef>
-          <a:fontRef idx="minor">
-            <a:schemeClr val="lt1"/>
-          </a:fontRef>
-        </p:style>
-        <p:txBody>
-          <a:bodyPr rtlCol="0" anchor="ctr"/>
-          <a:lstStyle/>
-          <a:p>
-            <a:pPr algn="ctr"/>
-            <a:endParaRPr lang="zh-CN" altLang="en-US"/>
-          </a:p>
-        </p:txBody>
-      </p:sp>
-      <p:pic>
-        <p:nvPicPr>
-          <p:cNvPr id="14" name="Picture 2" descr="C:\Documents and Settings\zhihliu\Desktop\icons\twitter-3d-square-1.png"/>
-          <p:cNvPicPr>
-            <a:picLocks noChangeAspect="1" noChangeArrowheads="1"/>
-          </p:cNvPicPr>
+        </p:grpSpPr>
+        <p:pic>
+          <p:nvPicPr>
+            <p:cNvPr id="1026" name="Picture 2" descr="C:\Documents and Settings\zhihliu\Desktop\icons\post-it-note.gif"/>
+            <p:cNvPicPr>
+              <a:picLocks noChangeAspect="1" noChangeArrowheads="1"/>
+            </p:cNvPicPr>
+            <p:nvPr/>
+          </p:nvPicPr>
+          <p:blipFill>
+            <a:blip r:embed="rId3" cstate="print"/>
+            <a:srcRect/>
+            <a:stretch>
+              <a:fillRect/>
+            </a:stretch>
+          </p:blipFill>
+          <p:spPr bwMode="auto">
+            <a:xfrm>
+              <a:off x="827584" y="1052736"/>
+              <a:ext cx="2960499" cy="3240360"/>
+            </a:xfrm>
+            <a:prstGeom prst="rect">
+              <a:avLst/>
+            </a:prstGeom>
+            <a:noFill/>
+          </p:spPr>
+        </p:pic>
+        <p:sp>
+          <p:nvSpPr>
+            <p:cNvPr id="4" name="TextBox 3"/>
+            <p:cNvSpPr txBox="1"/>
+            <p:nvPr/>
+          </p:nvSpPr>
+          <p:spPr>
+            <a:xfrm rot="21391780">
+              <a:off x="1153488" y="1627630"/>
+              <a:ext cx="2380624" cy="1323439"/>
+            </a:xfrm>
+            <a:prstGeom prst="rect">
+              <a:avLst/>
+            </a:prstGeom>
+            <a:noFill/>
+          </p:spPr>
+          <p:txBody>
+            <a:bodyPr wrap="square" rtlCol="0">
+              <a:spAutoFit/>
+            </a:bodyPr>
+            <a:lstStyle/>
+            <a:p>
+              <a:r>
+                <a:rPr lang="en-US" altLang="zh-CN" sz="2000" b="1" dirty="0" smtClean="0">
+                  <a:solidFill>
+                    <a:schemeClr val="accent1">
+                      <a:lumMod val="75000"/>
+                    </a:schemeClr>
+                  </a:solidFill>
+                  <a:latin typeface="Bradley Hand ITC" pitchFamily="66" charset="0"/>
+                </a:rPr>
+                <a:t>As a seller, I want to promote my products via my social-network.</a:t>
+              </a:r>
+              <a:endParaRPr lang="zh-CN" altLang="en-US" sz="2000" b="1" dirty="0">
+                <a:solidFill>
+                  <a:schemeClr val="accent1">
+                    <a:lumMod val="75000"/>
+                  </a:schemeClr>
+                </a:solidFill>
+                <a:latin typeface="Bradley Hand ITC" pitchFamily="66" charset="0"/>
+              </a:endParaRPr>
+            </a:p>
+          </p:txBody>
+        </p:sp>
+      </p:grpSp>
+      <p:grpSp>
+        <p:nvGrpSpPr>
+          <p:cNvPr id="8" name="Group 7"/>
+          <p:cNvGrpSpPr/>
           <p:nvPr/>
-        </p:nvPicPr>
-        <p:blipFill>
-          <a:blip r:embed="rId2" cstate="print"/>
-          <a:srcRect/>
-          <a:stretch>
-            <a:fillRect/>
-          </a:stretch>
-        </p:blipFill>
-        <p:spPr bwMode="auto">
+        </p:nvGrpSpPr>
+        <p:grpSpPr>
           <a:xfrm>
-            <a:off x="5076056" y="908720"/>
-            <a:ext cx="941469" cy="936104"/>
+            <a:off x="4707845" y="2060848"/>
+            <a:ext cx="2960499" cy="3240360"/>
+            <a:chOff x="4707845" y="2573288"/>
+            <a:chExt cx="2960499" cy="3240360"/>
           </a:xfrm>
-          <a:prstGeom prst="rect">
-            <a:avLst/>
-          </a:prstGeom>
-          <a:noFill/>
-        </p:spPr>
-      </p:pic>
-      <p:pic>
-        <p:nvPicPr>
-          <p:cNvPr id="15" name="Picture 2" descr="C:\Documents and Settings\zhihliu\Desktop\icons\facebook_icon_00108.png"/>
-          <p:cNvPicPr>
-            <a:picLocks noChangeAspect="1" noChangeArrowheads="1"/>
-          </p:cNvPicPr>
-          <p:nvPr/>
-        </p:nvPicPr>
-        <p:blipFill>
-          <a:blip r:embed="rId3" cstate="print"/>
-          <a:srcRect/>
-          <a:stretch>
-            <a:fillRect/>
-          </a:stretch>
-        </p:blipFill>
-        <p:spPr bwMode="auto">
-          <a:xfrm>
-            <a:off x="6516216" y="1052736"/>
-            <a:ext cx="936104" cy="936104"/>
-          </a:xfrm>
-          <a:prstGeom prst="rect">
-            <a:avLst/>
-          </a:prstGeom>
-          <a:noFill/>
-        </p:spPr>
-      </p:pic>
-      <p:pic>
-        <p:nvPicPr>
-          <p:cNvPr id="4100" name="Picture 4" descr="C:\Documents and Settings\zhihliu\Desktop\icons\t.sina.gif"/>
-          <p:cNvPicPr>
-            <a:picLocks noChangeAspect="1" noChangeArrowheads="1"/>
-          </p:cNvPicPr>
-          <p:nvPr/>
-        </p:nvPicPr>
-        <p:blipFill>
-          <a:blip r:embed="rId4" cstate="print"/>
-          <a:srcRect/>
-          <a:stretch>
-            <a:fillRect/>
-          </a:stretch>
-        </p:blipFill>
-        <p:spPr bwMode="auto">
-          <a:xfrm>
-            <a:off x="6948264" y="1916832"/>
-            <a:ext cx="931168" cy="931168"/>
-          </a:xfrm>
-          <a:prstGeom prst="rect">
-            <a:avLst/>
-          </a:prstGeom>
-          <a:noFill/>
-        </p:spPr>
-      </p:pic>
-      <p:pic>
-        <p:nvPicPr>
-          <p:cNvPr id="4102" name="Picture 6" descr="C:\Documents and Settings\zhihliu\Desktop\icons\ebay-logo-480x200.png"/>
-          <p:cNvPicPr>
-            <a:picLocks noChangeAspect="1" noChangeArrowheads="1"/>
-          </p:cNvPicPr>
-          <p:nvPr/>
-        </p:nvPicPr>
-        <p:blipFill>
-          <a:blip r:embed="rId5" cstate="print"/>
-          <a:srcRect/>
-          <a:stretch>
-            <a:fillRect/>
-          </a:stretch>
-        </p:blipFill>
-        <p:spPr bwMode="auto">
-          <a:xfrm>
-            <a:off x="3131840" y="2996952"/>
-            <a:ext cx="1639044" cy="682935"/>
-          </a:xfrm>
-          <a:prstGeom prst="rect">
-            <a:avLst/>
-          </a:prstGeom>
-          <a:noFill/>
-        </p:spPr>
-      </p:pic>
-      <p:pic>
-        <p:nvPicPr>
-          <p:cNvPr id="4104" name="Picture 8" descr="C:\Documents and Settings\zhihliu\Desktop\icons\flickr-rss.gif"/>
-          <p:cNvPicPr>
-            <a:picLocks noChangeAspect="1" noChangeArrowheads="1"/>
-          </p:cNvPicPr>
-          <p:nvPr/>
-        </p:nvPicPr>
-        <p:blipFill>
-          <a:blip r:embed="rId6" cstate="print"/>
-          <a:srcRect/>
-          <a:stretch>
-            <a:fillRect/>
-          </a:stretch>
-        </p:blipFill>
-        <p:spPr bwMode="auto">
-          <a:xfrm>
-            <a:off x="4927866" y="3140968"/>
-            <a:ext cx="1139974" cy="376750"/>
-          </a:xfrm>
-          <a:prstGeom prst="rect">
-            <a:avLst/>
-          </a:prstGeom>
-          <a:noFill/>
-        </p:spPr>
-      </p:pic>
-      <p:pic>
-        <p:nvPicPr>
-          <p:cNvPr id="8" name="Picture 5" descr="C:\Documents and Settings\zhihliu\Desktop\icons\androidx.gif"/>
-          <p:cNvPicPr>
-            <a:picLocks noChangeAspect="1" noChangeArrowheads="1"/>
-          </p:cNvPicPr>
-          <p:nvPr/>
-        </p:nvPicPr>
-        <p:blipFill>
-          <a:blip r:embed="rId7" cstate="print"/>
-          <a:srcRect/>
-          <a:stretch>
-            <a:fillRect/>
-          </a:stretch>
-        </p:blipFill>
-        <p:spPr bwMode="auto">
-          <a:xfrm>
-            <a:off x="2051720" y="5085184"/>
-            <a:ext cx="770384" cy="770384"/>
-          </a:xfrm>
-          <a:prstGeom prst="rect">
-            <a:avLst/>
-          </a:prstGeom>
-          <a:noFill/>
-        </p:spPr>
-      </p:pic>
+        </p:grpSpPr>
+        <p:pic>
+          <p:nvPicPr>
+            <p:cNvPr id="5" name="Picture 2" descr="C:\Documents and Settings\zhihliu\Desktop\icons\post-it-note.gif"/>
+            <p:cNvPicPr>
+              <a:picLocks noChangeAspect="1" noChangeArrowheads="1"/>
+            </p:cNvPicPr>
+            <p:nvPr/>
+          </p:nvPicPr>
+          <p:blipFill>
+            <a:blip r:embed="rId3" cstate="print"/>
+            <a:srcRect/>
+            <a:stretch>
+              <a:fillRect/>
+            </a:stretch>
+          </p:blipFill>
+          <p:spPr bwMode="auto">
+            <a:xfrm>
+              <a:off x="4707845" y="2573288"/>
+              <a:ext cx="2960499" cy="3240360"/>
+            </a:xfrm>
+            <a:prstGeom prst="rect">
+              <a:avLst/>
+            </a:prstGeom>
+            <a:noFill/>
+          </p:spPr>
+        </p:pic>
+        <p:sp>
+          <p:nvSpPr>
+            <p:cNvPr id="6" name="TextBox 5"/>
+            <p:cNvSpPr txBox="1"/>
+            <p:nvPr/>
+          </p:nvSpPr>
+          <p:spPr>
+            <a:xfrm rot="21391780">
+              <a:off x="4932733" y="3306493"/>
+              <a:ext cx="2535234" cy="1631216"/>
+            </a:xfrm>
+            <a:prstGeom prst="rect">
+              <a:avLst/>
+            </a:prstGeom>
+            <a:noFill/>
+          </p:spPr>
+          <p:txBody>
+            <a:bodyPr wrap="square" rtlCol="0">
+              <a:spAutoFit/>
+            </a:bodyPr>
+            <a:lstStyle/>
+            <a:p>
+              <a:r>
+                <a:rPr lang="en-US" altLang="zh-CN" sz="2000" dirty="0" smtClean="0">
+                  <a:solidFill>
+                    <a:schemeClr val="accent1">
+                      <a:lumMod val="75000"/>
+                    </a:schemeClr>
+                  </a:solidFill>
+                  <a:latin typeface="Kristen ITC" pitchFamily="66" charset="0"/>
+                </a:rPr>
+                <a:t>As a buyer, I want to be posted at the first time if something listed in eBay.</a:t>
+              </a:r>
+              <a:endParaRPr lang="en-US" altLang="zh-CN" sz="2000" dirty="0" smtClean="0">
+                <a:solidFill>
+                  <a:schemeClr val="accent1">
+                    <a:lumMod val="75000"/>
+                  </a:schemeClr>
+                </a:solidFill>
+                <a:latin typeface="Kristen ITC" pitchFamily="66" charset="0"/>
+              </a:endParaRPr>
+            </a:p>
+          </p:txBody>
+        </p:sp>
+      </p:grpSp>
     </p:spTree>
   </p:cSld>
   <p:clrMapOvr>
     <a:masterClrMapping/>
   </p:clrMapOvr>
+  <p:timing>
+    <p:tnLst>
+      <p:par>
+        <p:cTn id="1" dur="indefinite" restart="never" nodeType="tmRoot"/>
+      </p:par>
+    </p:tnLst>
+  </p:timing>
 </p:sld>
 </file>
 
@@ -4126,7 +4434,7 @@
       </p:grpSpPr>
       <p:pic>
         <p:nvPicPr>
-          <p:cNvPr id="1027" name="Picture 3" descr="C:\Documents and Settings\zhihliu\Desktop\icons\facebook.gif"/>
+          <p:cNvPr id="16386" name="Picture 2" descr="C:\Documents and Settings\zhihliu\Desktop\icons\twitter-3d-square-1.png"/>
           <p:cNvPicPr>
             <a:picLocks noChangeAspect="1" noChangeArrowheads="1"/>
           </p:cNvPicPr>
@@ -4140,19 +4448,25 @@
           </a:stretch>
         </p:blipFill>
         <p:spPr bwMode="auto">
-          <a:xfrm>
-            <a:off x="6804248" y="2665835"/>
-            <a:ext cx="864096" cy="864096"/>
+          <a:xfrm rot="1418480">
+            <a:off x="6016439" y="1058170"/>
+            <a:ext cx="941387" cy="936625"/>
           </a:xfrm>
           <a:prstGeom prst="rect">
             <a:avLst/>
           </a:prstGeom>
           <a:noFill/>
+          <a:ln w="9525">
+            <a:noFill/>
+            <a:miter lim="800000"/>
+            <a:headEnd/>
+            <a:tailEnd/>
+          </a:ln>
         </p:spPr>
       </p:pic>
       <p:pic>
         <p:nvPicPr>
-          <p:cNvPr id="1028" name="Picture 4" descr="C:\Documents and Settings\zhihliu\Desktop\icons\twitter.gif"/>
+          <p:cNvPr id="16387" name="Picture 2" descr="C:\Documents and Settings\zhihliu\Desktop\icons\facebook_icon_00108.png"/>
           <p:cNvPicPr>
             <a:picLocks noChangeAspect="1" noChangeArrowheads="1"/>
           </p:cNvPicPr>
@@ -4166,19 +4480,25 @@
           </a:stretch>
         </p:blipFill>
         <p:spPr bwMode="auto">
-          <a:xfrm>
-            <a:off x="6804248" y="1225675"/>
-            <a:ext cx="869603" cy="869603"/>
+          <a:xfrm rot="1321114">
+            <a:off x="7094488" y="1633785"/>
+            <a:ext cx="1077912" cy="1079500"/>
           </a:xfrm>
           <a:prstGeom prst="rect">
             <a:avLst/>
           </a:prstGeom>
           <a:noFill/>
+          <a:ln w="9525">
+            <a:noFill/>
+            <a:miter lim="800000"/>
+            <a:headEnd/>
+            <a:tailEnd/>
+          </a:ln>
         </p:spPr>
       </p:pic>
       <p:pic>
         <p:nvPicPr>
-          <p:cNvPr id="1029" name="Picture 5" descr="C:\Documents and Settings\zhihliu\Desktop\icons\flickr.jpg"/>
+          <p:cNvPr id="16388" name="Picture 4" descr="C:\Documents and Settings\zhihliu\Desktop\icons\t.sina.gif"/>
           <p:cNvPicPr>
             <a:picLocks noChangeAspect="1" noChangeArrowheads="1"/>
           </p:cNvPicPr>
@@ -4192,19 +4512,25 @@
           </a:stretch>
         </p:blipFill>
         <p:spPr bwMode="auto">
-          <a:xfrm>
-            <a:off x="1403648" y="3529931"/>
-            <a:ext cx="792088" cy="816414"/>
+          <a:xfrm rot="1004776">
+            <a:off x="7062789" y="2895190"/>
+            <a:ext cx="930275" cy="931863"/>
           </a:xfrm>
           <a:prstGeom prst="rect">
             <a:avLst/>
           </a:prstGeom>
           <a:noFill/>
+          <a:ln w="9525">
+            <a:noFill/>
+            <a:miter lim="800000"/>
+            <a:headEnd/>
+            <a:tailEnd/>
+          </a:ln>
         </p:spPr>
       </p:pic>
       <p:pic>
         <p:nvPicPr>
-          <p:cNvPr id="3081" name="Picture 9" descr="C:\Documents and Settings\zhihliu\Desktop\icons\t.sina.square.jpg"/>
+          <p:cNvPr id="16389" name="Picture 6" descr="C:\Documents and Settings\zhihliu\Desktop\icons\ebay-logo-480x200.png"/>
           <p:cNvPicPr>
             <a:picLocks noChangeAspect="1" noChangeArrowheads="1"/>
           </p:cNvPicPr>
@@ -4219,71 +4545,24 @@
         </p:blipFill>
         <p:spPr bwMode="auto">
           <a:xfrm>
-            <a:off x="6804248" y="4033987"/>
-            <a:ext cx="835173" cy="835173"/>
+            <a:off x="468164" y="2493094"/>
+            <a:ext cx="1639887" cy="682625"/>
           </a:xfrm>
           <a:prstGeom prst="rect">
             <a:avLst/>
           </a:prstGeom>
           <a:noFill/>
+          <a:ln w="9525">
+            <a:noFill/>
+            <a:miter lim="800000"/>
+            <a:headEnd/>
+            <a:tailEnd/>
+          </a:ln>
         </p:spPr>
       </p:pic>
-      <p:sp>
-        <p:nvSpPr>
-          <p:cNvPr id="22" name="Cloud 21"/>
-          <p:cNvSpPr/>
-          <p:nvPr/>
-        </p:nvSpPr>
-        <p:spPr>
-          <a:xfrm>
-            <a:off x="2627784" y="1657723"/>
-            <a:ext cx="3816424" cy="3096344"/>
-          </a:xfrm>
-          <a:prstGeom prst="cloud">
-            <a:avLst/>
-          </a:prstGeom>
-          <a:solidFill>
-            <a:schemeClr val="accent3">
-              <a:lumMod val="20000"/>
-              <a:lumOff val="80000"/>
-            </a:schemeClr>
-          </a:solidFill>
-          <a:ln>
-            <a:solidFill>
-              <a:schemeClr val="accent3">
-                <a:lumMod val="50000"/>
-              </a:schemeClr>
-            </a:solidFill>
-          </a:ln>
-        </p:spPr>
-        <p:style>
-          <a:lnRef idx="2">
-            <a:schemeClr val="accent1">
-              <a:shade val="50000"/>
-            </a:schemeClr>
-          </a:lnRef>
-          <a:fillRef idx="1">
-            <a:schemeClr val="accent1"/>
-          </a:fillRef>
-          <a:effectRef idx="0">
-            <a:schemeClr val="accent1"/>
-          </a:effectRef>
-          <a:fontRef idx="minor">
-            <a:schemeClr val="lt1"/>
-          </a:fontRef>
-        </p:style>
-        <p:txBody>
-          <a:bodyPr rtlCol="0" anchor="ctr"/>
-          <a:lstStyle/>
-          <a:p>
-            <a:pPr algn="ctr"/>
-            <a:endParaRPr lang="zh-CN" altLang="en-US"/>
-          </a:p>
-        </p:txBody>
-      </p:sp>
       <p:pic>
         <p:nvPicPr>
-          <p:cNvPr id="3077" name="Picture 5" descr="C:\Documents and Settings\zhihliu\Desktop\icons\androidx.gif"/>
+          <p:cNvPr id="16390" name="Picture 8" descr="C:\Documents and Settings\zhihliu\Desktop\icons\flickr-rss.gif"/>
           <p:cNvPicPr>
             <a:picLocks noChangeAspect="1" noChangeArrowheads="1"/>
           </p:cNvPicPr>
@@ -4298,72 +4577,497 @@
         </p:blipFill>
         <p:spPr bwMode="auto">
           <a:xfrm>
-            <a:off x="4716016" y="2233787"/>
-            <a:ext cx="770384" cy="770384"/>
+            <a:off x="1691680" y="1628800"/>
+            <a:ext cx="1139825" cy="376237"/>
+          </a:xfrm>
+          <a:prstGeom prst="rect">
+            <a:avLst/>
+          </a:prstGeom>
+          <a:noFill/>
+          <a:ln w="9525">
+            <a:noFill/>
+            <a:miter lim="800000"/>
+            <a:headEnd/>
+            <a:tailEnd/>
+          </a:ln>
+        </p:spPr>
+      </p:pic>
+      <p:grpSp>
+        <p:nvGrpSpPr>
+          <p:cNvPr id="2" name="Group 9"/>
+          <p:cNvGrpSpPr>
+            <a:grpSpLocks/>
+          </p:cNvGrpSpPr>
+          <p:nvPr/>
+        </p:nvGrpSpPr>
+        <p:grpSpPr bwMode="auto">
+          <a:xfrm>
+            <a:off x="2792710" y="4077072"/>
+            <a:ext cx="3219450" cy="1152525"/>
+            <a:chOff x="1746" y="2840"/>
+            <a:chExt cx="1846" cy="625"/>
+          </a:xfrm>
+        </p:grpSpPr>
+        <p:pic>
+          <p:nvPicPr>
+            <p:cNvPr id="16394" name="Picture 5" descr="C:\Documents and Settings\zhihliu\Desktop\icons\androidx.gif"/>
+            <p:cNvPicPr>
+              <a:picLocks noChangeAspect="1" noChangeArrowheads="1"/>
+            </p:cNvPicPr>
+            <p:nvPr/>
+          </p:nvPicPr>
+          <p:blipFill>
+            <a:blip r:embed="rId7" cstate="print"/>
+            <a:srcRect/>
+            <a:stretch>
+              <a:fillRect/>
+            </a:stretch>
+          </p:blipFill>
+          <p:spPr bwMode="auto">
+            <a:xfrm>
+              <a:off x="3288" y="3113"/>
+              <a:ext cx="304" cy="304"/>
+            </a:xfrm>
+            <a:prstGeom prst="rect">
+              <a:avLst/>
+            </a:prstGeom>
+            <a:noFill/>
+            <a:ln w="9525">
+              <a:noFill/>
+              <a:miter lim="800000"/>
+              <a:headEnd/>
+              <a:tailEnd/>
+            </a:ln>
+          </p:spPr>
+        </p:pic>
+        <p:pic>
+          <p:nvPicPr>
+            <p:cNvPr id="16395" name="Picture 11" descr="browser"/>
+            <p:cNvPicPr>
+              <a:picLocks noChangeAspect="1" noChangeArrowheads="1"/>
+            </p:cNvPicPr>
+            <p:nvPr/>
+          </p:nvPicPr>
+          <p:blipFill>
+            <a:blip r:embed="rId8" cstate="print"/>
+            <a:srcRect/>
+            <a:stretch>
+              <a:fillRect/>
+            </a:stretch>
+          </p:blipFill>
+          <p:spPr bwMode="auto">
+            <a:xfrm>
+              <a:off x="1746" y="2840"/>
+              <a:ext cx="1386" cy="625"/>
+            </a:xfrm>
+            <a:prstGeom prst="rect">
+              <a:avLst/>
+            </a:prstGeom>
+            <a:noFill/>
+          </p:spPr>
+        </p:pic>
+      </p:grpSp>
+      <p:grpSp>
+        <p:nvGrpSpPr>
+          <p:cNvPr id="3" name="Group 15"/>
+          <p:cNvGrpSpPr/>
+          <p:nvPr/>
+        </p:nvGrpSpPr>
+        <p:grpSpPr>
+          <a:xfrm>
+            <a:off x="2555776" y="1844824"/>
+            <a:ext cx="3887887" cy="2375470"/>
+            <a:chOff x="2484438" y="2205038"/>
+            <a:chExt cx="3959225" cy="2303462"/>
+          </a:xfrm>
+        </p:grpSpPr>
+        <p:sp>
+          <p:nvSpPr>
+            <p:cNvPr id="22" name="Cloud 21"/>
+            <p:cNvSpPr/>
+            <p:nvPr/>
+          </p:nvSpPr>
+          <p:spPr>
+            <a:xfrm>
+              <a:off x="2484438" y="2205038"/>
+              <a:ext cx="3959225" cy="2303462"/>
+            </a:xfrm>
+            <a:prstGeom prst="cloud">
+              <a:avLst/>
+            </a:prstGeom>
+            <a:solidFill>
+              <a:schemeClr val="accent3">
+                <a:lumMod val="20000"/>
+                <a:lumOff val="80000"/>
+              </a:schemeClr>
+            </a:solidFill>
+            <a:ln>
+              <a:solidFill>
+                <a:schemeClr val="accent3">
+                  <a:lumMod val="50000"/>
+                </a:schemeClr>
+              </a:solidFill>
+            </a:ln>
+            <a:effectLst>
+              <a:glow rad="101600">
+                <a:schemeClr val="accent3">
+                  <a:satMod val="175000"/>
+                  <a:alpha val="40000"/>
+                </a:schemeClr>
+              </a:glow>
+            </a:effectLst>
+          </p:spPr>
+          <p:style>
+            <a:lnRef idx="2">
+              <a:schemeClr val="accent1">
+                <a:shade val="50000"/>
+              </a:schemeClr>
+            </a:lnRef>
+            <a:fillRef idx="1">
+              <a:schemeClr val="accent1"/>
+            </a:fillRef>
+            <a:effectRef idx="0">
+              <a:schemeClr val="accent1"/>
+            </a:effectRef>
+            <a:fontRef idx="minor">
+              <a:schemeClr val="lt1"/>
+            </a:fontRef>
+          </p:style>
+          <p:txBody>
+            <a:bodyPr anchor="ctr"/>
+            <a:lstStyle/>
+            <a:p>
+              <a:pPr algn="ctr" fontAlgn="auto">
+                <a:spcBef>
+                  <a:spcPts val="0"/>
+                </a:spcBef>
+                <a:spcAft>
+                  <a:spcPts val="0"/>
+                </a:spcAft>
+                <a:defRPr/>
+              </a:pPr>
+              <a:endParaRPr lang="zh-CN" altLang="en-US"/>
+            </a:p>
+          </p:txBody>
+        </p:sp>
+        <p:pic>
+          <p:nvPicPr>
+            <p:cNvPr id="16396" name="Picture 8" descr="C:\Documents and Settings\zhihliu\Desktop\icons\gae-img.gif"/>
+            <p:cNvPicPr>
+              <a:picLocks noChangeAspect="1" noChangeArrowheads="1"/>
+            </p:cNvPicPr>
+            <p:nvPr/>
+          </p:nvPicPr>
+          <p:blipFill>
+            <a:blip r:embed="rId9" cstate="print"/>
+            <a:srcRect/>
+            <a:stretch>
+              <a:fillRect/>
+            </a:stretch>
+          </p:blipFill>
+          <p:spPr bwMode="auto">
+            <a:xfrm>
+              <a:off x="3779838" y="2852738"/>
+              <a:ext cx="1335087" cy="1022350"/>
+            </a:xfrm>
+            <a:prstGeom prst="rect">
+              <a:avLst/>
+            </a:prstGeom>
+            <a:noFill/>
+            <a:ln w="9525">
+              <a:noFill/>
+              <a:miter lim="800000"/>
+              <a:headEnd/>
+              <a:tailEnd/>
+            </a:ln>
+          </p:spPr>
+        </p:pic>
+      </p:grpSp>
+      <p:sp>
+        <p:nvSpPr>
+          <p:cNvPr id="13" name="Rectangle 12"/>
+          <p:cNvSpPr/>
+          <p:nvPr/>
+        </p:nvSpPr>
+        <p:spPr>
+          <a:xfrm>
+            <a:off x="755576" y="548680"/>
+            <a:ext cx="1537514" cy="830997"/>
           </a:xfrm>
           <a:prstGeom prst="rect">
             <a:avLst/>
           </a:prstGeom>
           <a:noFill/>
         </p:spPr>
-      </p:pic>
-      <p:pic>
-        <p:nvPicPr>
-          <p:cNvPr id="3080" name="Picture 8" descr="C:\Documents and Settings\zhihliu\Desktop\icons\gae-img.gif"/>
-          <p:cNvPicPr>
-            <a:picLocks noChangeAspect="1" noChangeArrowheads="1"/>
-          </p:cNvPicPr>
+        <p:txBody>
+          <a:bodyPr wrap="square" lIns="91440" tIns="45720" rIns="91440" bIns="45720">
+            <a:spAutoFit/>
+          </a:bodyPr>
+          <a:lstStyle/>
+          <a:p>
+            <a:pPr algn="ctr"/>
+            <a:r>
+              <a:rPr lang="en-US" altLang="zh-CN" sz="4800" b="1" spc="50" dirty="0" smtClean="0">
+                <a:ln w="13500">
+                  <a:solidFill>
+                    <a:schemeClr val="accent1">
+                      <a:shade val="2500"/>
+                      <a:alpha val="6500"/>
+                    </a:schemeClr>
+                  </a:solidFill>
+                  <a:prstDash val="solid"/>
+                </a:ln>
+                <a:solidFill>
+                  <a:schemeClr val="accent1">
+                    <a:tint val="3000"/>
+                    <a:alpha val="95000"/>
+                  </a:schemeClr>
+                </a:solidFill>
+                <a:effectLst>
+                  <a:glow rad="63500">
+                    <a:schemeClr val="accent1">
+                      <a:satMod val="175000"/>
+                      <a:alpha val="40000"/>
+                    </a:schemeClr>
+                  </a:glow>
+                  <a:outerShdw blurRad="60007" dist="310007" dir="8280000" sy="30000" kx="1300200" algn="ctr" rotWithShape="0">
+                    <a:prstClr val="black">
+                      <a:alpha val="32000"/>
+                    </a:prstClr>
+                  </a:outerShdw>
+                </a:effectLst>
+                <a:latin typeface="Chiller" pitchFamily="82" charset="0"/>
+              </a:rPr>
+              <a:t>Pull</a:t>
+            </a:r>
+            <a:endParaRPr lang="en-US" altLang="zh-CN" sz="2400" b="1" spc="50" dirty="0">
+              <a:ln w="13500">
+                <a:solidFill>
+                  <a:schemeClr val="accent1">
+                    <a:shade val="2500"/>
+                    <a:alpha val="6500"/>
+                  </a:schemeClr>
+                </a:solidFill>
+                <a:prstDash val="solid"/>
+              </a:ln>
+              <a:solidFill>
+                <a:schemeClr val="accent1">
+                  <a:tint val="3000"/>
+                  <a:alpha val="95000"/>
+                </a:schemeClr>
+              </a:solidFill>
+              <a:effectLst>
+                <a:glow rad="63500">
+                  <a:schemeClr val="accent1">
+                    <a:satMod val="175000"/>
+                    <a:alpha val="40000"/>
+                  </a:schemeClr>
+                </a:glow>
+                <a:outerShdw blurRad="60007" dist="310007" dir="8280000" sy="30000" kx="1300200" algn="ctr" rotWithShape="0">
+                  <a:prstClr val="black">
+                    <a:alpha val="32000"/>
+                  </a:prstClr>
+                </a:outerShdw>
+              </a:effectLst>
+              <a:latin typeface="Chiller" pitchFamily="82" charset="0"/>
+            </a:endParaRPr>
+          </a:p>
+        </p:txBody>
+      </p:sp>
+      <p:sp>
+        <p:nvSpPr>
+          <p:cNvPr id="14" name="Rectangle 13"/>
+          <p:cNvSpPr/>
           <p:nvPr/>
-        </p:nvPicPr>
-        <p:blipFill>
-          <a:blip r:embed="rId7" cstate="print"/>
-          <a:srcRect/>
-          <a:stretch>
-            <a:fillRect/>
-          </a:stretch>
-        </p:blipFill>
-        <p:spPr bwMode="auto">
+        </p:nvSpPr>
+        <p:spPr>
           <a:xfrm>
-            <a:off x="3419872" y="2953867"/>
-            <a:ext cx="1381125" cy="1057275"/>
+            <a:off x="6922918" y="332656"/>
+            <a:ext cx="1537514" cy="830997"/>
           </a:xfrm>
           <a:prstGeom prst="rect">
             <a:avLst/>
           </a:prstGeom>
           <a:noFill/>
         </p:spPr>
-      </p:pic>
-      <p:pic>
-        <p:nvPicPr>
-          <p:cNvPr id="3083" name="Picture 11" descr="C:\Documents and Settings\zhihliu\Desktop\icons\Ebay logo.png"/>
-          <p:cNvPicPr>
-            <a:picLocks noChangeAspect="1" noChangeArrowheads="1"/>
-          </p:cNvPicPr>
+        <p:txBody>
+          <a:bodyPr wrap="square" lIns="91440" tIns="45720" rIns="91440" bIns="45720">
+            <a:spAutoFit/>
+          </a:bodyPr>
+          <a:lstStyle/>
+          <a:p>
+            <a:pPr algn="ctr"/>
+            <a:r>
+              <a:rPr lang="en-US" altLang="zh-CN" sz="4800" b="1" spc="50" dirty="0" smtClean="0">
+                <a:ln w="13500">
+                  <a:solidFill>
+                    <a:schemeClr val="accent1">
+                      <a:shade val="2500"/>
+                      <a:alpha val="6500"/>
+                    </a:schemeClr>
+                  </a:solidFill>
+                  <a:prstDash val="solid"/>
+                </a:ln>
+                <a:solidFill>
+                  <a:schemeClr val="accent1">
+                    <a:tint val="3000"/>
+                    <a:alpha val="95000"/>
+                  </a:schemeClr>
+                </a:solidFill>
+                <a:effectLst>
+                  <a:glow rad="63500">
+                    <a:schemeClr val="accent4">
+                      <a:satMod val="175000"/>
+                      <a:alpha val="40000"/>
+                    </a:schemeClr>
+                  </a:glow>
+                  <a:outerShdw blurRad="59944" dist="200025" dir="16980000" sy="30000" kx="-1800000" algn="bl" rotWithShape="0">
+                    <a:prstClr val="black">
+                      <a:alpha val="32000"/>
+                    </a:prstClr>
+                  </a:outerShdw>
+                </a:effectLst>
+                <a:latin typeface="Chiller" pitchFamily="82" charset="0"/>
+              </a:rPr>
+              <a:t>Push</a:t>
+            </a:r>
+            <a:endParaRPr lang="en-US" altLang="zh-CN" sz="2400" b="1" spc="50" dirty="0">
+              <a:ln w="13500">
+                <a:solidFill>
+                  <a:schemeClr val="accent1">
+                    <a:shade val="2500"/>
+                    <a:alpha val="6500"/>
+                  </a:schemeClr>
+                </a:solidFill>
+                <a:prstDash val="solid"/>
+              </a:ln>
+              <a:solidFill>
+                <a:schemeClr val="accent1">
+                  <a:tint val="3000"/>
+                  <a:alpha val="95000"/>
+                </a:schemeClr>
+              </a:solidFill>
+              <a:effectLst>
+                <a:glow rad="63500">
+                  <a:schemeClr val="accent4">
+                    <a:satMod val="175000"/>
+                    <a:alpha val="40000"/>
+                  </a:schemeClr>
+                </a:glow>
+                <a:outerShdw blurRad="59944" dist="200025" dir="16980000" sy="30000" kx="-1800000" algn="bl" rotWithShape="0">
+                  <a:prstClr val="black">
+                    <a:alpha val="32000"/>
+                  </a:prstClr>
+                </a:outerShdw>
+              </a:effectLst>
+              <a:latin typeface="Chiller" pitchFamily="82" charset="0"/>
+            </a:endParaRPr>
+          </a:p>
+        </p:txBody>
+      </p:sp>
+      <p:sp>
+        <p:nvSpPr>
+          <p:cNvPr id="15" name="Rectangle 14"/>
+          <p:cNvSpPr/>
           <p:nvPr/>
-        </p:nvPicPr>
-        <p:blipFill>
-          <a:blip r:embed="rId8" cstate="print"/>
-          <a:srcRect/>
-          <a:stretch>
-            <a:fillRect/>
-          </a:stretch>
-        </p:blipFill>
-        <p:spPr bwMode="auto">
+        </p:nvSpPr>
+        <p:spPr>
           <a:xfrm>
-            <a:off x="1331640" y="2132856"/>
-            <a:ext cx="924123" cy="924123"/>
+            <a:off x="3106494" y="5262299"/>
+            <a:ext cx="2185586" cy="830997"/>
           </a:xfrm>
           <a:prstGeom prst="rect">
             <a:avLst/>
           </a:prstGeom>
           <a:noFill/>
         </p:spPr>
-      </p:pic>
+        <p:txBody>
+          <a:bodyPr wrap="square" lIns="91440" tIns="45720" rIns="91440" bIns="45720">
+            <a:spAutoFit/>
+          </a:bodyPr>
+          <a:lstStyle/>
+          <a:p>
+            <a:pPr algn="ctr"/>
+            <a:r>
+              <a:rPr lang="en-US" altLang="zh-CN" sz="4800" b="1" spc="50" dirty="0" err="1" smtClean="0">
+                <a:ln w="13500">
+                  <a:solidFill>
+                    <a:schemeClr val="accent1">
+                      <a:shade val="2500"/>
+                      <a:alpha val="6500"/>
+                    </a:schemeClr>
+                  </a:solidFill>
+                  <a:prstDash val="solid"/>
+                </a:ln>
+                <a:solidFill>
+                  <a:schemeClr val="accent1">
+                    <a:tint val="3000"/>
+                    <a:alpha val="95000"/>
+                  </a:schemeClr>
+                </a:solidFill>
+                <a:effectLst>
+                  <a:glow rad="63500">
+                    <a:schemeClr val="accent6">
+                      <a:satMod val="175000"/>
+                      <a:alpha val="40000"/>
+                    </a:schemeClr>
+                  </a:glow>
+                  <a:outerShdw blurRad="60071" sy="-30000" kx="800400" algn="bl" rotWithShape="0">
+                    <a:prstClr val="black">
+                      <a:alpha val="20000"/>
+                    </a:prstClr>
+                  </a:outerShdw>
+                </a:effectLst>
+                <a:latin typeface="Chiller" pitchFamily="82" charset="0"/>
+              </a:rPr>
+              <a:t>Config</a:t>
+            </a:r>
+            <a:endParaRPr lang="en-US" altLang="zh-CN" sz="2400" b="1" spc="50" dirty="0">
+              <a:ln w="13500">
+                <a:solidFill>
+                  <a:schemeClr val="accent1">
+                    <a:shade val="2500"/>
+                    <a:alpha val="6500"/>
+                  </a:schemeClr>
+                </a:solidFill>
+                <a:prstDash val="solid"/>
+              </a:ln>
+              <a:solidFill>
+                <a:schemeClr val="accent1">
+                  <a:tint val="3000"/>
+                  <a:alpha val="95000"/>
+                </a:schemeClr>
+              </a:solidFill>
+              <a:effectLst>
+                <a:glow rad="63500">
+                  <a:schemeClr val="accent6">
+                    <a:satMod val="175000"/>
+                    <a:alpha val="40000"/>
+                  </a:schemeClr>
+                </a:glow>
+                <a:outerShdw blurRad="60071" sy="-30000" kx="800400" algn="bl" rotWithShape="0">
+                  <a:prstClr val="black">
+                    <a:alpha val="20000"/>
+                  </a:prstClr>
+                </a:outerShdw>
+              </a:effectLst>
+              <a:latin typeface="Chiller" pitchFamily="82" charset="0"/>
+            </a:endParaRPr>
+          </a:p>
+        </p:txBody>
+      </p:sp>
     </p:spTree>
   </p:cSld>
   <p:clrMapOvr>
     <a:masterClrMapping/>
   </p:clrMapOvr>
+  <p:timing>
+    <p:tnLst>
+      <p:par>
+        <p:cTn id="1" dur="indefinite" restart="never" nodeType="tmRoot"/>
+      </p:par>
+    </p:tnLst>
+  </p:timing>
 </p:sld>
 </file>
 
@@ -4386,502 +5090,83 @@
       </p:grpSpPr>
       <p:sp>
         <p:nvSpPr>
-          <p:cNvPr id="9" name="Rounded Rectangle 8"/>
-          <p:cNvSpPr/>
-          <p:nvPr/>
+          <p:cNvPr id="3" name="Content Placeholder 2"/>
+          <p:cNvSpPr>
+            <a:spLocks noGrp="1"/>
+          </p:cNvSpPr>
+          <p:nvPr>
+            <p:ph idx="1"/>
+          </p:nvPr>
         </p:nvSpPr>
         <p:spPr>
           <a:xfrm>
-            <a:off x="2699792" y="1484784"/>
-            <a:ext cx="1080120" cy="2088232"/>
+            <a:off x="518864" y="260648"/>
+            <a:ext cx="8229600" cy="5865515"/>
           </a:xfrm>
-          <a:prstGeom prst="roundRect">
-            <a:avLst/>
-          </a:prstGeom>
-          <a:gradFill>
-            <a:gsLst>
-              <a:gs pos="0">
-                <a:srgbClr val="8488C4"/>
-              </a:gs>
-              <a:gs pos="53000">
-                <a:srgbClr val="D4DEFF"/>
-              </a:gs>
-              <a:gs pos="83000">
-                <a:srgbClr val="D4DEFF"/>
-              </a:gs>
-              <a:gs pos="100000">
-                <a:srgbClr val="96AB94"/>
-              </a:gs>
-            </a:gsLst>
-            <a:lin ang="3600000" scaled="0"/>
-          </a:gradFill>
-          <a:ln>
-            <a:gradFill>
-              <a:gsLst>
-                <a:gs pos="0">
-                  <a:schemeClr val="accent1">
-                    <a:tint val="66000"/>
-                    <a:satMod val="160000"/>
-                  </a:schemeClr>
-                </a:gs>
-                <a:gs pos="50000">
-                  <a:schemeClr val="accent1">
-                    <a:tint val="44500"/>
-                    <a:satMod val="160000"/>
-                  </a:schemeClr>
-                </a:gs>
-                <a:gs pos="100000">
-                  <a:schemeClr val="accent1">
-                    <a:tint val="23500"/>
-                    <a:satMod val="160000"/>
-                  </a:schemeClr>
-                </a:gs>
-              </a:gsLst>
-              <a:lin ang="5400000" scaled="0"/>
-            </a:gradFill>
-          </a:ln>
-          <a:effectLst>
-            <a:outerShdw blurRad="50800" dist="38100" dir="13500000" algn="br" rotWithShape="0">
-              <a:prstClr val="black">
-                <a:alpha val="40000"/>
-              </a:prstClr>
-            </a:outerShdw>
-          </a:effectLst>
         </p:spPr>
-        <p:style>
-          <a:lnRef idx="2">
-            <a:schemeClr val="accent1">
-              <a:shade val="50000"/>
-            </a:schemeClr>
-          </a:lnRef>
-          <a:fillRef idx="1">
-            <a:schemeClr val="accent1"/>
-          </a:fillRef>
-          <a:effectRef idx="0">
-            <a:schemeClr val="accent1"/>
-          </a:effectRef>
-          <a:fontRef idx="minor">
-            <a:schemeClr val="lt1"/>
-          </a:fontRef>
-        </p:style>
-        <p:txBody>
-          <a:bodyPr rtlCol="0" anchor="ctr"/>
-          <a:lstStyle/>
-          <a:p>
-            <a:pPr algn="ctr"/>
-            <a:endParaRPr lang="zh-CN" altLang="en-US" dirty="0"/>
-          </a:p>
-        </p:txBody>
-      </p:sp>
-      <p:pic>
-        <p:nvPicPr>
-          <p:cNvPr id="2053" name="Picture 5" descr="C:\Documents and Settings\zhihliu\Desktop\icons\flickr.jpg"/>
-          <p:cNvPicPr>
-            <a:picLocks noChangeAspect="1" noChangeArrowheads="1"/>
-          </p:cNvPicPr>
-          <p:nvPr/>
-        </p:nvPicPr>
-        <p:blipFill>
-          <a:blip r:embed="rId2" cstate="print"/>
-          <a:srcRect/>
-          <a:stretch>
-            <a:fillRect/>
-          </a:stretch>
-        </p:blipFill>
-        <p:spPr bwMode="auto">
-          <a:xfrm>
-            <a:off x="2779964" y="2564904"/>
-            <a:ext cx="936104" cy="936104"/>
-          </a:xfrm>
-          <a:prstGeom prst="rect">
-            <a:avLst/>
-          </a:prstGeom>
-          <a:noFill/>
-        </p:spPr>
-      </p:pic>
-      <p:sp>
-        <p:nvSpPr>
-          <p:cNvPr id="20" name="Right Arrow 19"/>
-          <p:cNvSpPr/>
-          <p:nvPr/>
-        </p:nvSpPr>
-        <p:spPr>
-          <a:xfrm>
-            <a:off x="3923928" y="2060848"/>
-            <a:ext cx="1152128" cy="936104"/>
-          </a:xfrm>
-          <a:prstGeom prst="rightArrow">
-            <a:avLst/>
-          </a:prstGeom>
-          <a:gradFill>
-            <a:gsLst>
-              <a:gs pos="0">
-                <a:srgbClr val="8488C4"/>
-              </a:gs>
-              <a:gs pos="53000">
-                <a:srgbClr val="D4DEFF"/>
-              </a:gs>
-              <a:gs pos="83000">
-                <a:srgbClr val="D4DEFF"/>
-              </a:gs>
-              <a:gs pos="100000">
-                <a:srgbClr val="96AB94"/>
-              </a:gs>
-            </a:gsLst>
-            <a:lin ang="0" scaled="0"/>
-          </a:gradFill>
-          <a:ln>
-            <a:noFill/>
-          </a:ln>
-          <a:effectLst>
-            <a:outerShdw blurRad="152400" dist="317500" dir="5400000" sx="90000" sy="-19000" rotWithShape="0">
-              <a:prstClr val="black">
-                <a:alpha val="15000"/>
-              </a:prstClr>
-            </a:outerShdw>
-          </a:effectLst>
-        </p:spPr>
-        <p:style>
-          <a:lnRef idx="2">
-            <a:schemeClr val="accent1">
-              <a:shade val="50000"/>
-            </a:schemeClr>
-          </a:lnRef>
-          <a:fillRef idx="1">
-            <a:schemeClr val="accent1"/>
-          </a:fillRef>
-          <a:effectRef idx="0">
-            <a:schemeClr val="accent1"/>
-          </a:effectRef>
-          <a:fontRef idx="minor">
-            <a:schemeClr val="lt1"/>
-          </a:fontRef>
-        </p:style>
-        <p:txBody>
-          <a:bodyPr rtlCol="0" anchor="ctr"/>
-          <a:lstStyle/>
-          <a:p>
-            <a:pPr algn="ctr"/>
-            <a:endParaRPr lang="zh-CN" altLang="en-US"/>
-          </a:p>
-        </p:txBody>
-      </p:sp>
-      <p:sp>
-        <p:nvSpPr>
-          <p:cNvPr id="14" name="Rounded Rectangle 13"/>
-          <p:cNvSpPr/>
-          <p:nvPr/>
-        </p:nvSpPr>
-        <p:spPr>
-          <a:xfrm>
-            <a:off x="5197212" y="836712"/>
-            <a:ext cx="1102980" cy="3384376"/>
-          </a:xfrm>
-          <a:prstGeom prst="roundRect">
-            <a:avLst/>
-          </a:prstGeom>
-          <a:gradFill flip="none" rotWithShape="1">
-            <a:gsLst>
-              <a:gs pos="0">
-                <a:schemeClr val="accent5">
-                  <a:lumMod val="20000"/>
-                  <a:lumOff val="80000"/>
-                </a:schemeClr>
-              </a:gs>
-              <a:gs pos="53000">
-                <a:srgbClr val="D4DEFF"/>
-              </a:gs>
-              <a:gs pos="83000">
-                <a:srgbClr val="D4DEFF"/>
-              </a:gs>
-              <a:gs pos="100000">
-                <a:srgbClr val="96AB94"/>
-              </a:gs>
-            </a:gsLst>
-            <a:lin ang="13500000" scaled="1"/>
-            <a:tileRect/>
-          </a:gradFill>
-          <a:ln>
-            <a:noFill/>
-          </a:ln>
-          <a:effectLst>
-            <a:outerShdw blurRad="50800" dist="38100" dir="13500000" algn="br" rotWithShape="0">
-              <a:prstClr val="black">
-                <a:alpha val="40000"/>
-              </a:prstClr>
-            </a:outerShdw>
-          </a:effectLst>
-        </p:spPr>
-        <p:style>
-          <a:lnRef idx="2">
-            <a:schemeClr val="accent1">
-              <a:shade val="50000"/>
-            </a:schemeClr>
-          </a:lnRef>
-          <a:fillRef idx="1">
-            <a:schemeClr val="accent1"/>
-          </a:fillRef>
-          <a:effectRef idx="0">
-            <a:schemeClr val="accent1"/>
-          </a:effectRef>
-          <a:fontRef idx="minor">
-            <a:schemeClr val="lt1"/>
-          </a:fontRef>
-        </p:style>
-        <p:txBody>
-          <a:bodyPr rtlCol="0" anchor="ctr"/>
-          <a:lstStyle/>
-          <a:p>
-            <a:pPr algn="ctr"/>
-            <a:endParaRPr lang="zh-CN" altLang="en-US" dirty="0"/>
-          </a:p>
-        </p:txBody>
-      </p:sp>
-      <p:pic>
-        <p:nvPicPr>
-          <p:cNvPr id="15" name="Picture 3" descr="C:\Documents and Settings\zhihliu\Desktop\icons\facebook.gif"/>
-          <p:cNvPicPr>
-            <a:picLocks noChangeAspect="1" noChangeArrowheads="1"/>
-          </p:cNvPicPr>
-          <p:nvPr/>
-        </p:nvPicPr>
-        <p:blipFill>
-          <a:blip r:embed="rId3" cstate="print"/>
-          <a:srcRect/>
-          <a:stretch>
-            <a:fillRect/>
-          </a:stretch>
-        </p:blipFill>
-        <p:spPr bwMode="auto">
-          <a:xfrm>
-            <a:off x="5220072" y="2060848"/>
-            <a:ext cx="1073280" cy="1073280"/>
-          </a:xfrm>
-          <a:prstGeom prst="rect">
-            <a:avLst/>
-          </a:prstGeom>
-          <a:noFill/>
-        </p:spPr>
-      </p:pic>
-      <p:pic>
-        <p:nvPicPr>
-          <p:cNvPr id="16" name="Picture 4" descr="C:\Documents and Settings\zhihliu\Desktop\icons\twitter.gif"/>
-          <p:cNvPicPr>
-            <a:picLocks noChangeAspect="1" noChangeArrowheads="1"/>
-          </p:cNvPicPr>
-          <p:nvPr/>
-        </p:nvPicPr>
-        <p:blipFill>
-          <a:blip r:embed="rId4" cstate="print"/>
-          <a:srcRect/>
-          <a:stretch>
-            <a:fillRect/>
-          </a:stretch>
-        </p:blipFill>
-        <p:spPr bwMode="auto">
-          <a:xfrm>
-            <a:off x="5220072" y="908720"/>
-            <a:ext cx="1008112" cy="1008112"/>
-          </a:xfrm>
-          <a:prstGeom prst="rect">
-            <a:avLst/>
-          </a:prstGeom>
-          <a:noFill/>
-        </p:spPr>
-      </p:pic>
-      <p:pic>
-        <p:nvPicPr>
-          <p:cNvPr id="2055" name="Picture 7" descr="C:\Documents and Settings\zhihliu\Desktop\icons\t.sina.square.gif"/>
-          <p:cNvPicPr>
-            <a:picLocks noChangeAspect="1" noChangeArrowheads="1"/>
-          </p:cNvPicPr>
-          <p:nvPr/>
-        </p:nvPicPr>
-        <p:blipFill>
-          <a:blip r:embed="rId5" cstate="print"/>
-          <a:srcRect/>
-          <a:stretch>
-            <a:fillRect/>
-          </a:stretch>
-        </p:blipFill>
-        <p:spPr bwMode="auto">
-          <a:xfrm>
-            <a:off x="5292080" y="3215630"/>
-            <a:ext cx="942975" cy="933450"/>
-          </a:xfrm>
-          <a:prstGeom prst="rect">
-            <a:avLst/>
-          </a:prstGeom>
-          <a:noFill/>
-        </p:spPr>
-      </p:pic>
-      <p:pic>
-        <p:nvPicPr>
-          <p:cNvPr id="2056" name="Picture 8" descr="C:\Documents and Settings\zhihliu\Desktop\icons\Ebay logo.png"/>
-          <p:cNvPicPr>
-            <a:picLocks noChangeAspect="1" noChangeArrowheads="1"/>
-          </p:cNvPicPr>
-          <p:nvPr/>
-        </p:nvPicPr>
-        <p:blipFill>
-          <a:blip r:embed="rId6" cstate="print"/>
-          <a:srcRect/>
-          <a:stretch>
-            <a:fillRect/>
-          </a:stretch>
-        </p:blipFill>
-        <p:spPr bwMode="auto">
-          <a:xfrm>
-            <a:off x="2739144" y="1556792"/>
-            <a:ext cx="1008112" cy="1008112"/>
-          </a:xfrm>
-          <a:prstGeom prst="rect">
-            <a:avLst/>
-          </a:prstGeom>
-          <a:noFill/>
-        </p:spPr>
-      </p:pic>
-      <p:sp>
-        <p:nvSpPr>
-          <p:cNvPr id="30" name="Rounded Rectangle 29"/>
-          <p:cNvSpPr/>
-          <p:nvPr/>
-        </p:nvSpPr>
-        <p:spPr>
-          <a:xfrm>
-            <a:off x="2699792" y="4437112"/>
-            <a:ext cx="3600400" cy="1224136"/>
-          </a:xfrm>
-          <a:prstGeom prst="roundRect">
-            <a:avLst/>
-          </a:prstGeom>
-          <a:gradFill>
-            <a:gsLst>
-              <a:gs pos="50000">
-                <a:schemeClr val="accent1">
-                  <a:tint val="66000"/>
-                  <a:satMod val="160000"/>
-                </a:schemeClr>
-              </a:gs>
-              <a:gs pos="50000">
-                <a:schemeClr val="accent1">
-                  <a:tint val="44500"/>
-                  <a:satMod val="160000"/>
-                </a:schemeClr>
-              </a:gs>
-              <a:gs pos="100000">
-                <a:schemeClr val="accent1">
-                  <a:tint val="23500"/>
-                  <a:satMod val="160000"/>
-                </a:schemeClr>
-              </a:gs>
-            </a:gsLst>
-            <a:lin ang="3600000" scaled="0"/>
-          </a:gradFill>
-          <a:ln>
-            <a:noFill/>
-          </a:ln>
-          <a:effectLst>
-            <a:outerShdw blurRad="50800" dist="38100" dir="13500000" algn="br" rotWithShape="0">
-              <a:prstClr val="black">
-                <a:alpha val="40000"/>
-              </a:prstClr>
-            </a:outerShdw>
-          </a:effectLst>
-        </p:spPr>
-        <p:style>
-          <a:lnRef idx="2">
-            <a:schemeClr val="accent1">
-              <a:shade val="50000"/>
-            </a:schemeClr>
-          </a:lnRef>
-          <a:fillRef idx="1">
-            <a:schemeClr val="accent1"/>
-          </a:fillRef>
-          <a:effectRef idx="0">
-            <a:schemeClr val="accent1"/>
-          </a:effectRef>
-          <a:fontRef idx="minor">
-            <a:schemeClr val="lt1"/>
-          </a:fontRef>
-        </p:style>
-        <p:txBody>
-          <a:bodyPr rtlCol="0" anchor="ctr"/>
-          <a:lstStyle/>
-          <a:p>
-            <a:pPr algn="ctr"/>
-            <a:endParaRPr lang="zh-CN" altLang="en-US" dirty="0"/>
-          </a:p>
-        </p:txBody>
-      </p:sp>
-      <p:pic>
-        <p:nvPicPr>
-          <p:cNvPr id="2058" name="Picture 10" descr="C:\Documents and Settings\zhihliu\Desktop\icons\androidx.gif"/>
-          <p:cNvPicPr>
-            <a:picLocks noChangeAspect="1" noChangeArrowheads="1"/>
-          </p:cNvPicPr>
-          <p:nvPr/>
-        </p:nvPicPr>
-        <p:blipFill>
-          <a:blip r:embed="rId7" cstate="print"/>
-          <a:srcRect/>
-          <a:stretch>
-            <a:fillRect/>
-          </a:stretch>
-        </p:blipFill>
-        <p:spPr bwMode="auto">
-          <a:xfrm>
-            <a:off x="4881736" y="4581128"/>
-            <a:ext cx="914400" cy="914400"/>
-          </a:xfrm>
-          <a:prstGeom prst="rect">
-            <a:avLst/>
-          </a:prstGeom>
-          <a:noFill/>
-          <a:ln>
-            <a:noFill/>
-          </a:ln>
-        </p:spPr>
-      </p:pic>
-      <p:pic>
-        <p:nvPicPr>
-          <p:cNvPr id="2059" name="Picture 11" descr="C:\Documents and Settings\zhihliu\Desktop\icons\gae-img.gif"/>
-          <p:cNvPicPr>
-            <a:picLocks noChangeAspect="1" noChangeArrowheads="1"/>
-          </p:cNvPicPr>
-          <p:nvPr/>
-        </p:nvPicPr>
-        <p:blipFill>
-          <a:blip r:embed="rId8" cstate="print"/>
-          <a:srcRect/>
-          <a:stretch>
-            <a:fillRect/>
-          </a:stretch>
-        </p:blipFill>
-        <p:spPr bwMode="auto">
-          <a:xfrm>
-            <a:off x="3225552" y="4558642"/>
-            <a:ext cx="1224136" cy="937098"/>
-          </a:xfrm>
-          <a:prstGeom prst="rect">
-            <a:avLst/>
-          </a:prstGeom>
-          <a:noFill/>
-          <a:ln>
-            <a:noFill/>
-          </a:ln>
-          <a:scene3d>
-            <a:camera prst="orthographicFront"/>
-            <a:lightRig rig="threePt" dir="t"/>
-          </a:scene3d>
-          <a:sp3d prstMaterial="flat"/>
-        </p:spPr>
-      </p:pic>
+        <p:txBody>
+          <a:bodyPr/>
+          <a:lstStyle/>
+          <a:p>
+            <a:r>
+              <a:rPr lang="en-US" altLang="zh-CN" dirty="0" smtClean="0"/>
+              <a:t>Easy to configure</a:t>
+            </a:r>
+          </a:p>
+          <a:p>
+            <a:pPr lvl="1"/>
+            <a:r>
+              <a:rPr lang="en-US" altLang="zh-CN" dirty="0" smtClean="0"/>
+              <a:t>4 clicks</a:t>
+            </a:r>
+          </a:p>
+          <a:p>
+            <a:pPr lvl="1"/>
+            <a:endParaRPr lang="en-US" altLang="zh-CN" dirty="0" smtClean="0"/>
+          </a:p>
+          <a:p>
+            <a:r>
+              <a:rPr lang="en-US" altLang="zh-CN" dirty="0" smtClean="0"/>
+              <a:t>Works in Cloud</a:t>
+            </a:r>
+          </a:p>
+          <a:p>
+            <a:endParaRPr lang="en-US" altLang="zh-CN" dirty="0" smtClean="0"/>
+          </a:p>
+          <a:p>
+            <a:r>
+              <a:rPr lang="en-US" altLang="zh-CN" dirty="0" smtClean="0"/>
+              <a:t>Anywhere, Anytime</a:t>
+            </a:r>
+          </a:p>
+          <a:p>
+            <a:pPr lvl="1"/>
+            <a:r>
+              <a:rPr lang="en-US" altLang="zh-CN" dirty="0" smtClean="0"/>
+              <a:t>Browser</a:t>
+            </a:r>
+          </a:p>
+          <a:p>
+            <a:pPr lvl="1"/>
+            <a:r>
+              <a:rPr lang="en-US" altLang="zh-CN" dirty="0" smtClean="0"/>
+              <a:t>Android</a:t>
+            </a:r>
+          </a:p>
+        </p:txBody>
+      </p:sp>
     </p:spTree>
   </p:cSld>
   <p:clrMapOvr>
     <a:masterClrMapping/>
   </p:clrMapOvr>
+  <p:timing>
+    <p:tnLst>
+      <p:par>
+        <p:cTn id="1" dur="indefinite" restart="never" nodeType="tmRoot"/>
+      </p:par>
+    </p:tnLst>
+  </p:timing>
 </p:sld>
 </file>
 

</xml_diff>